<commit_message>
final pre course updates
</commit_message>
<xml_diff>
--- a/slides/01-intro.pptx
+++ b/slides/01-intro.pptx
@@ -123,6 +123,11 @@
       </a:defRPr>
     </a:lvl9pPr>
   </p:defaultTextStyle>
+  <p:extLst>
+    <p:ext uri="{EFAFB233-063F-42B5-8137-9DF3F51BA10A}">
+      <p15:sldGuideLst xmlns:p15="http://schemas.microsoft.com/office/powerpoint/2012/main"/>
+    </p:ext>
+  </p:extLst>
 </p:presentation>
 </file>
 
@@ -208,7 +213,7 @@
           <a:p>
             <a:fld id="{15DA2908-672F-DC48-8CAD-AEE711B947DA}" type="datetimeFigureOut">
               <a:rPr lang="en-US" smtClean="0"/>
-              <a:t>6/26/25</a:t>
+              <a:t>6/29/25</a:t>
             </a:fld>
             <a:endParaRPr lang="en-US"/>
           </a:p>
@@ -2761,7 +2766,7 @@
           <a:p>
             <a:fld id="{F6CCBF3A-D7FB-4B97-8FD5-6FFB20CB1E84}" type="datetimeFigureOut">
               <a:rPr lang="en-US" smtClean="0"/>
-              <a:t>6/26/25</a:t>
+              <a:t>6/29/25</a:t>
             </a:fld>
             <a:endParaRPr lang="en-US"/>
           </a:p>
@@ -4220,7 +4225,7 @@
           <a:p>
             <a:fld id="{F6CCBF3A-D7FB-4B97-8FD5-6FFB20CB1E84}" type="datetimeFigureOut">
               <a:rPr lang="en-US" smtClean="0"/>
-              <a:t>6/26/25</a:t>
+              <a:t>6/29/25</a:t>
             </a:fld>
             <a:endParaRPr lang="en-US"/>
           </a:p>
@@ -5673,7 +5678,7 @@
           <a:p>
             <a:fld id="{F6CCBF3A-D7FB-4B97-8FD5-6FFB20CB1E84}" type="datetimeFigureOut">
               <a:rPr lang="en-US" smtClean="0"/>
-              <a:t>6/26/25</a:t>
+              <a:t>6/29/25</a:t>
             </a:fld>
             <a:endParaRPr lang="en-US"/>
           </a:p>
@@ -8048,7 +8053,7 @@
           <a:p>
             <a:fld id="{F6CCBF3A-D7FB-4B97-8FD5-6FFB20CB1E84}" type="datetimeFigureOut">
               <a:rPr lang="en-US" smtClean="0"/>
-              <a:t>6/26/25</a:t>
+              <a:t>6/29/25</a:t>
             </a:fld>
             <a:endParaRPr lang="en-US"/>
           </a:p>
@@ -9556,7 +9561,7 @@
           <a:p>
             <a:fld id="{F6CCBF3A-D7FB-4B97-8FD5-6FFB20CB1E84}" type="datetimeFigureOut">
               <a:rPr lang="en-US" smtClean="0"/>
-              <a:t>6/26/25</a:t>
+              <a:t>6/29/25</a:t>
             </a:fld>
             <a:endParaRPr lang="en-US"/>
           </a:p>
@@ -11077,7 +11082,7 @@
           <a:p>
             <a:fld id="{F6CCBF3A-D7FB-4B97-8FD5-6FFB20CB1E84}" type="datetimeFigureOut">
               <a:rPr lang="en-US" smtClean="0"/>
-              <a:t>6/26/25</a:t>
+              <a:t>6/29/25</a:t>
             </a:fld>
             <a:endParaRPr lang="en-US"/>
           </a:p>
@@ -12742,7 +12747,7 @@
           <a:p>
             <a:fld id="{F6CCBF3A-D7FB-4B97-8FD5-6FFB20CB1E84}" type="datetimeFigureOut">
               <a:rPr lang="en-US" smtClean="0"/>
-              <a:t>6/26/25</a:t>
+              <a:t>6/29/25</a:t>
             </a:fld>
             <a:endParaRPr lang="en-US"/>
           </a:p>
@@ -14140,7 +14145,7 @@
           <a:p>
             <a:fld id="{F6CCBF3A-D7FB-4B97-8FD5-6FFB20CB1E84}" type="datetimeFigureOut">
               <a:rPr lang="en-US" smtClean="0"/>
-              <a:t>6/26/25</a:t>
+              <a:t>6/29/25</a:t>
             </a:fld>
             <a:endParaRPr lang="en-US"/>
           </a:p>
@@ -14240,7 +14245,7 @@
           <a:p>
             <a:fld id="{F6CCBF3A-D7FB-4B97-8FD5-6FFB20CB1E84}" type="datetimeFigureOut">
               <a:rPr lang="en-US" smtClean="0"/>
-              <a:t>6/26/25</a:t>
+              <a:t>6/29/25</a:t>
             </a:fld>
             <a:endParaRPr lang="en-US"/>
           </a:p>
@@ -15766,7 +15771,7 @@
           <a:p>
             <a:fld id="{F6CCBF3A-D7FB-4B97-8FD5-6FFB20CB1E84}" type="datetimeFigureOut">
               <a:rPr lang="en-US" smtClean="0"/>
-              <a:t>6/26/25</a:t>
+              <a:t>6/29/25</a:t>
             </a:fld>
             <a:endParaRPr lang="en-US"/>
           </a:p>
@@ -17302,7 +17307,7 @@
           <a:p>
             <a:fld id="{F6CCBF3A-D7FB-4B97-8FD5-6FFB20CB1E84}" type="datetimeFigureOut">
               <a:rPr lang="en-US" smtClean="0"/>
-              <a:t>6/26/25</a:t>
+              <a:t>6/29/25</a:t>
             </a:fld>
             <a:endParaRPr lang="en-US"/>
           </a:p>
@@ -17525,7 +17530,7 @@
           <a:p>
             <a:fld id="{F6CCBF3A-D7FB-4B97-8FD5-6FFB20CB1E84}" type="datetimeFigureOut">
               <a:rPr lang="en-US" smtClean="0"/>
-              <a:t>6/26/25</a:t>
+              <a:t>6/29/25</a:t>
             </a:fld>
             <a:endParaRPr lang="en-US"/>
           </a:p>
@@ -18216,37 +18221,6 @@
               <a:rPr lang="en-US" dirty="0"/>
               <a:t>Key Components of AI Workflows</a:t>
             </a:r>
-          </a:p>
-        </p:txBody>
-      </p:sp>
-      <p:sp>
-        <p:nvSpPr>
-          <p:cNvPr id="3" name="Slide Number Placeholder 2">
-            <a:extLst>
-              <a:ext uri="{FF2B5EF4-FFF2-40B4-BE49-F238E27FC236}">
-                <a16:creationId xmlns:a16="http://schemas.microsoft.com/office/drawing/2014/main" id="{AA9FFBED-370D-2283-88F1-FE82567EF0A5}"/>
-              </a:ext>
-            </a:extLst>
-          </p:cNvPr>
-          <p:cNvSpPr>
-            <a:spLocks noGrp="1"/>
-          </p:cNvSpPr>
-          <p:nvPr>
-            <p:ph type="sldNum" sz="quarter" idx="10"/>
-          </p:nvPr>
-        </p:nvSpPr>
-        <p:spPr/>
-        <p:txBody>
-          <a:bodyPr/>
-          <a:lstStyle/>
-          <a:p>
-            <a:pPr algn="r"/>
-            <a:fld id="{8FB4CE90-470A-43E3-A052-3E8AD880B4A5}" type="slidenum">
-              <a:rPr lang="en-US" smtClean="0"/>
-              <a:pPr algn="r"/>
-              <a:t>11</a:t>
-            </a:fld>
-            <a:endParaRPr lang="en-US"/>
           </a:p>
         </p:txBody>
       </p:sp>
@@ -19491,74 +19465,6 @@
               <a:rPr lang="en-US" dirty="0"/>
               <a:t>Key Vocabulary</a:t>
             </a:r>
-          </a:p>
-        </p:txBody>
-      </p:sp>
-      <p:sp>
-        <p:nvSpPr>
-          <p:cNvPr id="3" name="Slide Number Placeholder 2">
-            <a:extLst>
-              <a:ext uri="{FF2B5EF4-FFF2-40B4-BE49-F238E27FC236}">
-                <a16:creationId xmlns:a16="http://schemas.microsoft.com/office/drawing/2014/main" id="{B496405D-6B58-BB4D-7579-7BDDAEF6BAE7}"/>
-              </a:ext>
-            </a:extLst>
-          </p:cNvPr>
-          <p:cNvSpPr>
-            <a:spLocks noGrp="1"/>
-          </p:cNvSpPr>
-          <p:nvPr>
-            <p:ph type="sldNum" sz="quarter" idx="10"/>
-          </p:nvPr>
-        </p:nvSpPr>
-        <p:spPr/>
-        <p:txBody>
-          <a:bodyPr/>
-          <a:lstStyle/>
-          <a:p>
-            <a:pPr algn="r"/>
-            <a:fld id="{8FB4CE90-470A-43E3-A052-3E8AD880B4A5}" type="slidenum">
-              <a:rPr lang="en-US" smtClean="0"/>
-              <a:pPr algn="r"/>
-              <a:t>12</a:t>
-            </a:fld>
-            <a:endParaRPr lang="en-US"/>
-          </a:p>
-        </p:txBody>
-      </p:sp>
-      <p:sp>
-        <p:nvSpPr>
-          <p:cNvPr id="4" name="Footer Placeholder 3">
-            <a:extLst>
-              <a:ext uri="{FF2B5EF4-FFF2-40B4-BE49-F238E27FC236}">
-                <a16:creationId xmlns:a16="http://schemas.microsoft.com/office/drawing/2014/main" id="{4F115F95-7702-03F8-890E-ED93B8960E79}"/>
-              </a:ext>
-            </a:extLst>
-          </p:cNvPr>
-          <p:cNvSpPr>
-            <a:spLocks noGrp="1"/>
-          </p:cNvSpPr>
-          <p:nvPr>
-            <p:ph type="ftr" sz="quarter" idx="11"/>
-          </p:nvPr>
-        </p:nvSpPr>
-        <p:spPr/>
-        <p:txBody>
-          <a:bodyPr/>
-          <a:lstStyle/>
-          <a:p>
-            <a:pPr algn="ctr">
-              <a:lnSpc>
-                <a:spcPct val="90000"/>
-              </a:lnSpc>
-              <a:spcBef>
-                <a:spcPts val="1000"/>
-              </a:spcBef>
-            </a:pPr>
-            <a:r>
-              <a:rPr lang="en-US"/>
-              <a:t>Confidential &amp; Proprietary – Not for Distribution</a:t>
-            </a:r>
-            <a:endParaRPr lang="en-US" dirty="0"/>
           </a:p>
         </p:txBody>
       </p:sp>

</xml_diff>